<commit_message>
README and minor updates
</commit_message>
<xml_diff>
--- a/Predicting CA Vaccination Rates.pptx
+++ b/Predicting CA Vaccination Rates.pptx
@@ -4799,7 +4799,7 @@
 <dgm:dataModel xmlns:dgm="http://schemas.openxmlformats.org/drawingml/2006/diagram" xmlns:a="http://schemas.openxmlformats.org/drawingml/2006/main">
   <dgm:ptLst>
     <dgm:pt modelId="{49AA2BDB-3536-4DF9-AF00-88B13035743B}" type="doc">
-      <dgm:prSet loTypeId="urn:microsoft.com/office/officeart/2005/8/layout/vList2" loCatId="list" qsTypeId="urn:microsoft.com/office/officeart/2005/8/quickstyle/simple1" qsCatId="simple" csTypeId="urn:microsoft.com/office/officeart/2005/8/colors/colorful1" csCatId="colorful"/>
+      <dgm:prSet loTypeId="urn:microsoft.com/office/officeart/2005/8/layout/vList2" loCatId="list" qsTypeId="urn:microsoft.com/office/officeart/2005/8/quickstyle/simple1" qsCatId="simple" csTypeId="urn:microsoft.com/office/officeart/2005/8/colors/colorful1" csCatId="colorful" phldr="1"/>
       <dgm:spPr/>
       <dgm:t>
         <a:bodyPr/>
@@ -4935,7 +4935,7 @@
         <a:lstStyle/>
         <a:p>
           <a:r>
-            <a:rPr lang="en-US"/>
+            <a:rPr lang="en-US" dirty="0"/>
             <a:t>Records from 2000-2015 (used records from 2010-2014 for this analysis)</a:t>
           </a:r>
         </a:p>
@@ -5045,6 +5045,28 @@
         </a:p>
       </dgm:t>
     </dgm:pt>
+    <dgm:pt modelId="{6BE6F985-74C8-3D4B-92ED-F5D9A54BFE17}">
+      <dgm:prSet/>
+      <dgm:spPr/>
+      <dgm:t>
+        <a:bodyPr/>
+        <a:lstStyle/>
+        <a:p>
+          <a:r>
+            <a:rPr lang="en-US" dirty="0"/>
+            <a:t>Calculated vaccination rate from school population and the number of vaccination exemptions per school.</a:t>
+          </a:r>
+        </a:p>
+      </dgm:t>
+    </dgm:pt>
+    <dgm:pt modelId="{3F3177A5-F5A3-7944-A85B-EE51F9A2C6BC}" type="parTrans" cxnId="{C5812B0D-F971-4A41-B3F6-3C3FA5FA5E5D}">
+      <dgm:prSet/>
+      <dgm:spPr/>
+    </dgm:pt>
+    <dgm:pt modelId="{9058F0C3-128E-7449-821B-684A1BD7A213}" type="sibTrans" cxnId="{C5812B0D-F971-4A41-B3F6-3C3FA5FA5E5D}">
+      <dgm:prSet/>
+      <dgm:spPr/>
+    </dgm:pt>
     <dgm:pt modelId="{C464BF8B-2CAA-E443-B07A-B212BCA43172}" type="pres">
       <dgm:prSet presAssocID="{49AA2BDB-3536-4DF9-AF00-88B13035743B}" presName="linear" presStyleCnt="0">
         <dgm:presLayoutVars>
@@ -5090,6 +5112,7 @@
     </dgm:pt>
   </dgm:ptLst>
   <dgm:cxnLst>
+    <dgm:cxn modelId="{C5812B0D-F971-4A41-B3F6-3C3FA5FA5E5D}" srcId="{B02515B4-B158-4433-AA8A-D53C4FC3A899}" destId="{6BE6F985-74C8-3D4B-92ED-F5D9A54BFE17}" srcOrd="3" destOrd="0" parTransId="{3F3177A5-F5A3-7944-A85B-EE51F9A2C6BC}" sibTransId="{9058F0C3-128E-7449-821B-684A1BD7A213}"/>
     <dgm:cxn modelId="{0739A114-D782-8941-8A3F-9166CFD1DD36}" type="presOf" srcId="{5485B2A8-D7FD-400F-AFEE-62354B45D6F2}" destId="{4C14C57B-25C3-774C-A9D9-923452BE6298}" srcOrd="0" destOrd="0" presId="urn:microsoft.com/office/officeart/2005/8/layout/vList2"/>
     <dgm:cxn modelId="{24D78D16-82B2-4235-A049-3C4D2FF77D77}" srcId="{B02515B4-B158-4433-AA8A-D53C4FC3A899}" destId="{B4B02477-F7CA-4045-829F-FA54EDF16743}" srcOrd="2" destOrd="0" parTransId="{F64E2873-B933-44A2-9074-98BF5C9D453E}" sibTransId="{64E62EB3-D645-4924-90E6-BC6BE29380C9}"/>
     <dgm:cxn modelId="{E6679A2E-F71B-824F-B18F-1C288CF4D7EC}" type="presOf" srcId="{B02515B4-B158-4433-AA8A-D53C4FC3A899}" destId="{EB8B9829-6D9D-3447-9256-F3F15C1A7A9D}" srcOrd="0" destOrd="0" presId="urn:microsoft.com/office/officeart/2005/8/layout/vList2"/>
@@ -5101,6 +5124,7 @@
     <dgm:cxn modelId="{66588F98-1013-479C-BE10-574782346A49}" srcId="{49AA2BDB-3536-4DF9-AF00-88B13035743B}" destId="{B02515B4-B158-4433-AA8A-D53C4FC3A899}" srcOrd="0" destOrd="0" parTransId="{A0D75C57-F80B-4D0C-9057-7A76D5BB9C30}" sibTransId="{CF694521-88A4-487A-9F4D-1458E6F7B10E}"/>
     <dgm:cxn modelId="{5F692CC6-F5AB-4E10-A6A3-00FD02502D5C}" srcId="{B02515B4-B158-4433-AA8A-D53C4FC3A899}" destId="{94373E98-EA23-4DBA-A9A8-049E6C678D78}" srcOrd="0" destOrd="0" parTransId="{81E9D0D5-C5A1-4107-B3D6-09165F3A1B9F}" sibTransId="{6F5EEDA5-A1C4-4B0D-B7D2-003C1DB8542B}"/>
     <dgm:cxn modelId="{E6710EDC-FF49-4E97-835B-CD2972A3DE00}" srcId="{49AA2BDB-3536-4DF9-AF00-88B13035743B}" destId="{8B768C73-2D54-435B-9CEC-7B0F0A044A05}" srcOrd="1" destOrd="0" parTransId="{31B2AA64-8194-4BAF-A2A1-FF5280376FD1}" sibTransId="{E6990D0D-10FE-44EE-A4AF-43BB145D9225}"/>
+    <dgm:cxn modelId="{3FD229E3-D844-3940-8AF8-74C5797A16F1}" type="presOf" srcId="{6BE6F985-74C8-3D4B-92ED-F5D9A54BFE17}" destId="{8A3E887C-3164-AB43-B1B0-444BBD16C852}" srcOrd="0" destOrd="3" presId="urn:microsoft.com/office/officeart/2005/8/layout/vList2"/>
     <dgm:cxn modelId="{F4DE60E9-8CB1-4B58-9E56-C30DB01EFCA1}" srcId="{8B768C73-2D54-435B-9CEC-7B0F0A044A05}" destId="{5485B2A8-D7FD-400F-AFEE-62354B45D6F2}" srcOrd="0" destOrd="0" parTransId="{9B444194-2E6A-4B32-A059-3F989F816BFE}" sibTransId="{79911982-95D4-4B7C-862B-80F491DB4A0E}"/>
     <dgm:cxn modelId="{A625F4F0-A8E7-944F-A89F-F482096B7673}" type="presOf" srcId="{94373E98-EA23-4DBA-A9A8-049E6C678D78}" destId="{8A3E887C-3164-AB43-B1B0-444BBD16C852}" srcOrd="0" destOrd="0" presId="urn:microsoft.com/office/officeart/2005/8/layout/vList2"/>
     <dgm:cxn modelId="{73F8CD73-5624-E441-B57B-74F72DDBB88A}" type="presParOf" srcId="{C464BF8B-2CAA-E443-B07A-B212BCA43172}" destId="{EB8B9829-6D9D-3447-9256-F3F15C1A7A9D}" srcOrd="0" destOrd="0" presId="urn:microsoft.com/office/officeart/2005/8/layout/vList2"/>
@@ -6055,8 +6079,8 @@
       </dsp:nvSpPr>
       <dsp:spPr>
         <a:xfrm>
-          <a:off x="0" y="265612"/>
-          <a:ext cx="4885203" cy="1510396"/>
+          <a:off x="0" y="327470"/>
+          <a:ext cx="4885203" cy="1034280"/>
         </a:xfrm>
         <a:prstGeom prst="roundRect">
           <a:avLst/>
@@ -6097,12 +6121,12 @@
         </a:fontRef>
       </dsp:style>
       <dsp:txBody>
-        <a:bodyPr spcFirstLastPara="0" vert="horz" wrap="square" lIns="102870" tIns="102870" rIns="102870" bIns="102870" numCol="1" spcCol="1270" anchor="ctr" anchorCtr="0">
+        <a:bodyPr spcFirstLastPara="0" vert="horz" wrap="square" lIns="99060" tIns="99060" rIns="99060" bIns="99060" numCol="1" spcCol="1270" anchor="ctr" anchorCtr="0">
           <a:noAutofit/>
         </a:bodyPr>
         <a:lstStyle/>
         <a:p>
-          <a:pPr marL="0" lvl="0" indent="0" algn="l" defTabSz="1200150">
+          <a:pPr marL="0" lvl="0" indent="0" algn="l" defTabSz="1155700">
             <a:lnSpc>
               <a:spcPct val="90000"/>
             </a:lnSpc>
@@ -6115,24 +6139,24 @@
             <a:buNone/>
           </a:pPr>
           <a:r>
-            <a:rPr lang="en-US" sz="2700" kern="1200"/>
+            <a:rPr lang="en-US" sz="2600" kern="1200"/>
             <a:t>CA Kindergarten Immunization records (</a:t>
           </a:r>
           <a:r>
-            <a:rPr lang="en-US" sz="2700" kern="1200">
+            <a:rPr lang="en-US" sz="2600" kern="1200">
               <a:hlinkClick xmlns:r="http://schemas.openxmlformats.org/officeDocument/2006/relationships" r:id="rId1"/>
             </a:rPr>
             <a:t>Kaggle</a:t>
           </a:r>
           <a:r>
-            <a:rPr lang="en-US" sz="2700" kern="1200"/>
+            <a:rPr lang="en-US" sz="2600" kern="1200"/>
             <a:t>)</a:t>
           </a:r>
         </a:p>
       </dsp:txBody>
       <dsp:txXfrm>
-        <a:off x="73731" y="339343"/>
-        <a:ext cx="4737741" cy="1362934"/>
+        <a:off x="50489" y="377959"/>
+        <a:ext cx="4784225" cy="933302"/>
       </dsp:txXfrm>
     </dsp:sp>
     <dsp:sp modelId="{8A3E887C-3164-AB43-B1B0-444BBD16C852}">
@@ -6142,8 +6166,8 @@
       </dsp:nvSpPr>
       <dsp:spPr>
         <a:xfrm>
-          <a:off x="0" y="1776009"/>
-          <a:ext cx="4885203" cy="1676699"/>
+          <a:off x="0" y="1361750"/>
+          <a:ext cx="4885203" cy="2529540"/>
         </a:xfrm>
         <a:prstGeom prst="rect">
           <a:avLst/>
@@ -6167,12 +6191,12 @@
         <a:fontRef idx="minor"/>
       </dsp:style>
       <dsp:txBody>
-        <a:bodyPr spcFirstLastPara="0" vert="horz" wrap="square" lIns="155105" tIns="34290" rIns="192024" bIns="34290" numCol="1" spcCol="1270" anchor="t" anchorCtr="0">
+        <a:bodyPr spcFirstLastPara="0" vert="horz" wrap="square" lIns="155105" tIns="33020" rIns="184912" bIns="33020" numCol="1" spcCol="1270" anchor="t" anchorCtr="0">
           <a:noAutofit/>
         </a:bodyPr>
         <a:lstStyle/>
         <a:p>
-          <a:pPr marL="228600" lvl="1" indent="-228600" algn="l" defTabSz="933450">
+          <a:pPr marL="228600" lvl="1" indent="-228600" algn="l" defTabSz="889000">
             <a:lnSpc>
               <a:spcPct val="90000"/>
             </a:lnSpc>
@@ -6185,12 +6209,12 @@
             <a:buChar char="•"/>
           </a:pPr>
           <a:r>
-            <a:rPr lang="en-US" sz="2100" kern="1200"/>
+            <a:rPr lang="en-US" sz="2000" kern="1200"/>
             <a:t>Number of students</a:t>
           </a:r>
         </a:p>
         <a:p>
-          <a:pPr marL="228600" lvl="1" indent="-228600" algn="l" defTabSz="933450">
+          <a:pPr marL="228600" lvl="1" indent="-228600" algn="l" defTabSz="889000">
             <a:lnSpc>
               <a:spcPct val="90000"/>
             </a:lnSpc>
@@ -6203,12 +6227,12 @@
             <a:buChar char="•"/>
           </a:pPr>
           <a:r>
-            <a:rPr lang="en-US" sz="2100" kern="1200"/>
+            <a:rPr lang="en-US" sz="2000" kern="1200"/>
             <a:t>Number of students with vaccination records</a:t>
           </a:r>
         </a:p>
         <a:p>
-          <a:pPr marL="228600" lvl="1" indent="-228600" algn="l" defTabSz="933450">
+          <a:pPr marL="228600" lvl="1" indent="-228600" algn="l" defTabSz="889000">
             <a:lnSpc>
               <a:spcPct val="90000"/>
             </a:lnSpc>
@@ -6221,14 +6245,32 @@
             <a:buChar char="•"/>
           </a:pPr>
           <a:r>
-            <a:rPr lang="en-US" sz="2100" kern="1200"/>
+            <a:rPr lang="en-US" sz="2000" kern="1200" dirty="0"/>
             <a:t>Records from 2000-2015 (used records from 2010-2014 for this analysis)</a:t>
+          </a:r>
+        </a:p>
+        <a:p>
+          <a:pPr marL="228600" lvl="1" indent="-228600" algn="l" defTabSz="889000">
+            <a:lnSpc>
+              <a:spcPct val="90000"/>
+            </a:lnSpc>
+            <a:spcBef>
+              <a:spcPct val="0"/>
+            </a:spcBef>
+            <a:spcAft>
+              <a:spcPct val="20000"/>
+            </a:spcAft>
+            <a:buChar char="•"/>
+          </a:pPr>
+          <a:r>
+            <a:rPr lang="en-US" sz="2000" kern="1200" dirty="0"/>
+            <a:t>Calculated vaccination rate from school population and the number of vaccination exemptions per school.</a:t>
           </a:r>
         </a:p>
       </dsp:txBody>
       <dsp:txXfrm>
-        <a:off x="0" y="1776009"/>
-        <a:ext cx="4885203" cy="1676699"/>
+        <a:off x="0" y="1361750"/>
+        <a:ext cx="4885203" cy="2529540"/>
       </dsp:txXfrm>
     </dsp:sp>
     <dsp:sp modelId="{11CBBFA8-97A9-2C4A-B342-DC05517B5491}">
@@ -6238,8 +6280,8 @@
       </dsp:nvSpPr>
       <dsp:spPr>
         <a:xfrm>
-          <a:off x="0" y="3452709"/>
-          <a:ext cx="4885203" cy="1510396"/>
+          <a:off x="0" y="3891290"/>
+          <a:ext cx="4885203" cy="1034280"/>
         </a:xfrm>
         <a:prstGeom prst="roundRect">
           <a:avLst/>
@@ -6280,12 +6322,12 @@
         </a:fontRef>
       </dsp:style>
       <dsp:txBody>
-        <a:bodyPr spcFirstLastPara="0" vert="horz" wrap="square" lIns="102870" tIns="102870" rIns="102870" bIns="102870" numCol="1" spcCol="1270" anchor="ctr" anchorCtr="0">
+        <a:bodyPr spcFirstLastPara="0" vert="horz" wrap="square" lIns="99060" tIns="99060" rIns="99060" bIns="99060" numCol="1" spcCol="1270" anchor="ctr" anchorCtr="0">
           <a:noAutofit/>
         </a:bodyPr>
         <a:lstStyle/>
         <a:p>
-          <a:pPr marL="0" lvl="0" indent="0" algn="l" defTabSz="1200150">
+          <a:pPr marL="0" lvl="0" indent="0" algn="l" defTabSz="1155700">
             <a:lnSpc>
               <a:spcPct val="90000"/>
             </a:lnSpc>
@@ -6298,14 +6340,14 @@
             <a:buNone/>
           </a:pPr>
           <a:r>
-            <a:rPr lang="en-US" sz="2700" kern="1200"/>
+            <a:rPr lang="en-US" sz="2600" kern="1200"/>
             <a:t>2010-2014 American Community Survey (5-year estimates) </a:t>
           </a:r>
         </a:p>
       </dsp:txBody>
       <dsp:txXfrm>
-        <a:off x="73731" y="3526440"/>
-        <a:ext cx="4737741" cy="1362934"/>
+        <a:off x="50489" y="3941779"/>
+        <a:ext cx="4784225" cy="933302"/>
       </dsp:txXfrm>
     </dsp:sp>
     <dsp:sp modelId="{4C14C57B-25C3-774C-A9D9-923452BE6298}">
@@ -6315,8 +6357,8 @@
       </dsp:nvSpPr>
       <dsp:spPr>
         <a:xfrm>
-          <a:off x="0" y="4963106"/>
-          <a:ext cx="4885203" cy="656707"/>
+          <a:off x="0" y="4925570"/>
+          <a:ext cx="4885203" cy="632385"/>
         </a:xfrm>
         <a:prstGeom prst="rect">
           <a:avLst/>
@@ -6340,12 +6382,12 @@
         <a:fontRef idx="minor"/>
       </dsp:style>
       <dsp:txBody>
-        <a:bodyPr spcFirstLastPara="0" vert="horz" wrap="square" lIns="155105" tIns="34290" rIns="192024" bIns="34290" numCol="1" spcCol="1270" anchor="t" anchorCtr="0">
+        <a:bodyPr spcFirstLastPara="0" vert="horz" wrap="square" lIns="155105" tIns="33020" rIns="184912" bIns="33020" numCol="1" spcCol="1270" anchor="t" anchorCtr="0">
           <a:noAutofit/>
         </a:bodyPr>
         <a:lstStyle/>
         <a:p>
-          <a:pPr marL="228600" lvl="1" indent="-228600" algn="l" defTabSz="933450">
+          <a:pPr marL="228600" lvl="1" indent="-228600" algn="l" defTabSz="889000">
             <a:lnSpc>
               <a:spcPct val="90000"/>
             </a:lnSpc>
@@ -6358,24 +6400,24 @@
             <a:buChar char="•"/>
           </a:pPr>
           <a:r>
-            <a:rPr lang="en-US" sz="2100" kern="1200"/>
+            <a:rPr lang="en-US" sz="2000" kern="1200"/>
             <a:t>Estimates performed by (</a:t>
           </a:r>
           <a:r>
-            <a:rPr lang="en-US" sz="2100" kern="1200">
+            <a:rPr lang="en-US" sz="2000" kern="1200">
               <a:hlinkClick xmlns:r="http://schemas.openxmlformats.org/officeDocument/2006/relationships" r:id="rId2"/>
             </a:rPr>
             <a:t>CA Dept. of Finance</a:t>
           </a:r>
           <a:r>
-            <a:rPr lang="en-US" sz="2100" kern="1200"/>
+            <a:rPr lang="en-US" sz="2000" kern="1200"/>
             <a:t>)</a:t>
           </a:r>
         </a:p>
       </dsp:txBody>
       <dsp:txXfrm>
-        <a:off x="0" y="4963106"/>
-        <a:ext cx="4885203" cy="656707"/>
+        <a:off x="0" y="4925570"/>
+        <a:ext cx="4885203" cy="632385"/>
       </dsp:txXfrm>
     </dsp:sp>
   </dsp:spTree>
@@ -13208,7 +13250,10 @@
           <a:bodyPr/>
           <a:lstStyle/>
           <a:p>
-            <a:endParaRPr lang="en-US" dirty="0"/>
+            <a:r>
+              <a:rPr lang="en-US" dirty="0"/>
+              <a:t>New York just banned unvaccinated individuals from public spaces.</a:t>
+            </a:r>
           </a:p>
         </p:txBody>
       </p:sp>
@@ -13249,6 +13294,93 @@
 </file>
 
 <file path=ppt/notesSlides/notesSlide2.xml><?xml version="1.0" encoding="utf-8"?>
+<p:notes xmlns:a="http://schemas.openxmlformats.org/drawingml/2006/main" xmlns:r="http://schemas.openxmlformats.org/officeDocument/2006/relationships" xmlns:p="http://schemas.openxmlformats.org/presentationml/2006/main">
+  <p:cSld>
+    <p:spTree>
+      <p:nvGrpSpPr>
+        <p:cNvPr id="1" name=""/>
+        <p:cNvGrpSpPr/>
+        <p:nvPr/>
+      </p:nvGrpSpPr>
+      <p:grpSpPr>
+        <a:xfrm>
+          <a:off x="0" y="0"/>
+          <a:ext cx="0" cy="0"/>
+          <a:chOff x="0" y="0"/>
+          <a:chExt cx="0" cy="0"/>
+        </a:xfrm>
+      </p:grpSpPr>
+      <p:sp>
+        <p:nvSpPr>
+          <p:cNvPr id="2" name="Slide Image Placeholder 1"/>
+          <p:cNvSpPr>
+            <a:spLocks noGrp="1" noRot="1" noChangeAspect="1"/>
+          </p:cNvSpPr>
+          <p:nvPr>
+            <p:ph type="sldImg"/>
+          </p:nvPr>
+        </p:nvSpPr>
+        <p:spPr/>
+      </p:sp>
+      <p:sp>
+        <p:nvSpPr>
+          <p:cNvPr id="3" name="Notes Placeholder 2"/>
+          <p:cNvSpPr>
+            <a:spLocks noGrp="1"/>
+          </p:cNvSpPr>
+          <p:nvPr>
+            <p:ph type="body" idx="1"/>
+          </p:nvPr>
+        </p:nvSpPr>
+        <p:spPr/>
+        <p:txBody>
+          <a:bodyPr/>
+          <a:lstStyle/>
+          <a:p>
+            <a:r>
+              <a:rPr lang="en-US" dirty="0"/>
+              <a:t>Measles in Particular is highly contagious, requiring a high vaccination rate (~95%)</a:t>
+            </a:r>
+          </a:p>
+        </p:txBody>
+      </p:sp>
+      <p:sp>
+        <p:nvSpPr>
+          <p:cNvPr id="4" name="Slide Number Placeholder 3"/>
+          <p:cNvSpPr>
+            <a:spLocks noGrp="1"/>
+          </p:cNvSpPr>
+          <p:nvPr>
+            <p:ph type="sldNum" sz="quarter" idx="5"/>
+          </p:nvPr>
+        </p:nvSpPr>
+        <p:spPr/>
+        <p:txBody>
+          <a:bodyPr/>
+          <a:lstStyle/>
+          <a:p>
+            <a:fld id="{F4DE31C4-E3E7-EA43-9F7B-5AC7DC319451}" type="slidenum">
+              <a:rPr lang="en-US" smtClean="0"/>
+              <a:t>3</a:t>
+            </a:fld>
+            <a:endParaRPr lang="en-US"/>
+          </a:p>
+        </p:txBody>
+      </p:sp>
+    </p:spTree>
+    <p:extLst>
+      <p:ext uri="{BB962C8B-B14F-4D97-AF65-F5344CB8AC3E}">
+        <p14:creationId xmlns:p14="http://schemas.microsoft.com/office/powerpoint/2010/main" val="3483845937"/>
+      </p:ext>
+    </p:extLst>
+  </p:cSld>
+  <p:clrMapOvr>
+    <a:masterClrMapping/>
+  </p:clrMapOvr>
+</p:notes>
+</file>
+
+<file path=ppt/notesSlides/notesSlide3.xml><?xml version="1.0" encoding="utf-8"?>
 <p:notes xmlns:a="http://schemas.openxmlformats.org/drawingml/2006/main" xmlns:r="http://schemas.openxmlformats.org/officeDocument/2006/relationships" xmlns:p="http://schemas.openxmlformats.org/presentationml/2006/main">
   <p:cSld>
     <p:spTree>
@@ -13356,7 +13488,7 @@
 </p:notes>
 </file>
 
-<file path=ppt/notesSlides/notesSlide3.xml><?xml version="1.0" encoding="utf-8"?>
+<file path=ppt/notesSlides/notesSlide4.xml><?xml version="1.0" encoding="utf-8"?>
 <p:notes xmlns:a="http://schemas.openxmlformats.org/drawingml/2006/main" xmlns:r="http://schemas.openxmlformats.org/officeDocument/2006/relationships" xmlns:p="http://schemas.openxmlformats.org/presentationml/2006/main">
   <p:cSld>
     <p:spTree>
@@ -13406,9 +13538,23 @@
             </a:r>
           </a:p>
           <a:p>
+            <a:pPr marL="171450" indent="-171450">
+              <a:buFontTx/>
+              <a:buChar char="-"/>
+            </a:pPr>
             <a:r>
               <a:rPr lang="en-US" dirty="0"/>
-              <a:t>-Highly contagious diseases can be as high as 95%</a:t>
+              <a:t>Highly contagious diseases can be as high as 95%</a:t>
+            </a:r>
+          </a:p>
+          <a:p>
+            <a:pPr marL="171450" indent="-171450">
+              <a:buFontTx/>
+              <a:buChar char="-"/>
+            </a:pPr>
+            <a:r>
+              <a:rPr lang="en-US" dirty="0"/>
+              <a:t>Also because of the the ease of transportation, any communities that are low can have an impact.</a:t>
             </a:r>
           </a:p>
         </p:txBody>
@@ -13449,7 +13595,7 @@
 </p:notes>
 </file>
 
-<file path=ppt/notesSlides/notesSlide4.xml><?xml version="1.0" encoding="utf-8"?>
+<file path=ppt/notesSlides/notesSlide5.xml><?xml version="1.0" encoding="utf-8"?>
 <p:notes xmlns:a="http://schemas.openxmlformats.org/drawingml/2006/main" xmlns:r="http://schemas.openxmlformats.org/officeDocument/2006/relationships" xmlns:p="http://schemas.openxmlformats.org/presentationml/2006/main">
   <p:cSld>
     <p:spTree>
@@ -13547,7 +13693,7 @@
 </p:notes>
 </file>
 
-<file path=ppt/notesSlides/notesSlide5.xml><?xml version="1.0" encoding="utf-8"?>
+<file path=ppt/notesSlides/notesSlide6.xml><?xml version="1.0" encoding="utf-8"?>
 <p:notes xmlns:a="http://schemas.openxmlformats.org/drawingml/2006/main" xmlns:r="http://schemas.openxmlformats.org/officeDocument/2006/relationships" xmlns:p="http://schemas.openxmlformats.org/presentationml/2006/main">
   <p:cSld>
     <p:spTree>
@@ -13678,7 +13824,7 @@
 </p:notes>
 </file>
 
-<file path=ppt/notesSlides/notesSlide6.xml><?xml version="1.0" encoding="utf-8"?>
+<file path=ppt/notesSlides/notesSlide7.xml><?xml version="1.0" encoding="utf-8"?>
 <p:notes xmlns:a="http://schemas.openxmlformats.org/drawingml/2006/main" xmlns:r="http://schemas.openxmlformats.org/officeDocument/2006/relationships" xmlns:p="http://schemas.openxmlformats.org/presentationml/2006/main">
   <p:cSld>
     <p:spTree>
@@ -13771,7 +13917,7 @@
 </p:notes>
 </file>
 
-<file path=ppt/notesSlides/notesSlide7.xml><?xml version="1.0" encoding="utf-8"?>
+<file path=ppt/notesSlides/notesSlide8.xml><?xml version="1.0" encoding="utf-8"?>
 <p:notes xmlns:a="http://schemas.openxmlformats.org/drawingml/2006/main" xmlns:r="http://schemas.openxmlformats.org/officeDocument/2006/relationships" xmlns:p="http://schemas.openxmlformats.org/presentationml/2006/main">
   <p:cSld>
     <p:spTree>
@@ -19352,7 +19498,7 @@
           </p:nvPr>
         </p:nvPicPr>
         <p:blipFill>
-          <a:blip r:embed="rId2"/>
+          <a:blip r:embed="rId3"/>
           <a:stretch>
             <a:fillRect/>
           </a:stretch>
@@ -19436,7 +19582,7 @@
           </p:nvPr>
         </p:nvPicPr>
         <p:blipFill>
-          <a:blip r:embed="rId3"/>
+          <a:blip r:embed="rId4"/>
           <a:stretch>
             <a:fillRect/>
           </a:stretch>
@@ -20614,7 +20760,7 @@
             <p:ph idx="1"/>
             <p:extLst>
               <p:ext uri="{D42A27DB-BD31-4B8C-83A1-F6EECF244321}">
-                <p14:modId xmlns:p14="http://schemas.microsoft.com/office/powerpoint/2010/main" val="131896762"/>
+                <p14:modId xmlns:p14="http://schemas.microsoft.com/office/powerpoint/2010/main" val="2655815011"/>
               </p:ext>
             </p:extLst>
           </p:nvPr>
@@ -20889,13 +21035,8 @@
             </a:pPr>
             <a:r>
               <a:rPr lang="en-US" sz="1400" dirty="0"/>
-              <a:t>Min</a:t>
+              <a:t>Min: 79.9%</a:t>
             </a:r>
-            <a:r>
-              <a:rPr lang="en-US" sz="1400"/>
-              <a:t>: 79.9%</a:t>
-            </a:r>
-            <a:endParaRPr lang="en-US" sz="1400" dirty="0"/>
           </a:p>
           <a:p>
             <a:pPr indent="-228600" defTabSz="914400">

</xml_diff>